<commit_message>
New files have been added
</commit_message>
<xml_diff>
--- a/5/Web ծրագրավորման դասընթաց - Դաս 5.pptx
+++ b/5/Web ծրագրավորման դասընթաց - Դաս 5.pptx
@@ -37,7 +37,10 @@
     <p:sldId id="304" r:id="rId31"/>
     <p:sldId id="305" r:id="rId32"/>
     <p:sldId id="287" r:id="rId33"/>
-    <p:sldId id="266" r:id="rId34"/>
+    <p:sldId id="307" r:id="rId34"/>
+    <p:sldId id="308" r:id="rId35"/>
+    <p:sldId id="309" r:id="rId36"/>
+    <p:sldId id="266" r:id="rId37"/>
   </p:sldIdLst>
   <p:sldSz cx="12192000" cy="6858000"/>
   <p:notesSz cx="6858000" cy="9144000"/>
@@ -291,7 +294,7 @@
           <a:p>
             <a:fld id="{B054DD91-EB8A-463F-8F8B-D25AE6D5CF75}" type="datetimeFigureOut">
               <a:rPr lang="en-US" smtClean="0"/>
-              <a:t>5/21/2020</a:t>
+              <a:t>5/25/2020</a:t>
             </a:fld>
             <a:endParaRPr lang="en-US"/>
           </a:p>
@@ -489,7 +492,7 @@
           <a:p>
             <a:fld id="{B054DD91-EB8A-463F-8F8B-D25AE6D5CF75}" type="datetimeFigureOut">
               <a:rPr lang="en-US" smtClean="0"/>
-              <a:t>5/21/2020</a:t>
+              <a:t>5/25/2020</a:t>
             </a:fld>
             <a:endParaRPr lang="en-US"/>
           </a:p>
@@ -697,7 +700,7 @@
           <a:p>
             <a:fld id="{B054DD91-EB8A-463F-8F8B-D25AE6D5CF75}" type="datetimeFigureOut">
               <a:rPr lang="en-US" smtClean="0"/>
-              <a:t>5/21/2020</a:t>
+              <a:t>5/25/2020</a:t>
             </a:fld>
             <a:endParaRPr lang="en-US"/>
           </a:p>
@@ -895,7 +898,7 @@
           <a:p>
             <a:fld id="{B054DD91-EB8A-463F-8F8B-D25AE6D5CF75}" type="datetimeFigureOut">
               <a:rPr lang="en-US" smtClean="0"/>
-              <a:t>5/21/2020</a:t>
+              <a:t>5/25/2020</a:t>
             </a:fld>
             <a:endParaRPr lang="en-US"/>
           </a:p>
@@ -1170,7 +1173,7 @@
           <a:p>
             <a:fld id="{B054DD91-EB8A-463F-8F8B-D25AE6D5CF75}" type="datetimeFigureOut">
               <a:rPr lang="en-US" smtClean="0"/>
-              <a:t>5/21/2020</a:t>
+              <a:t>5/25/2020</a:t>
             </a:fld>
             <a:endParaRPr lang="en-US"/>
           </a:p>
@@ -1435,7 +1438,7 @@
           <a:p>
             <a:fld id="{B054DD91-EB8A-463F-8F8B-D25AE6D5CF75}" type="datetimeFigureOut">
               <a:rPr lang="en-US" smtClean="0"/>
-              <a:t>5/21/2020</a:t>
+              <a:t>5/25/2020</a:t>
             </a:fld>
             <a:endParaRPr lang="en-US"/>
           </a:p>
@@ -1847,7 +1850,7 @@
           <a:p>
             <a:fld id="{B054DD91-EB8A-463F-8F8B-D25AE6D5CF75}" type="datetimeFigureOut">
               <a:rPr lang="en-US" smtClean="0"/>
-              <a:t>5/21/2020</a:t>
+              <a:t>5/25/2020</a:t>
             </a:fld>
             <a:endParaRPr lang="en-US"/>
           </a:p>
@@ -1988,7 +1991,7 @@
           <a:p>
             <a:fld id="{B054DD91-EB8A-463F-8F8B-D25AE6D5CF75}" type="datetimeFigureOut">
               <a:rPr lang="en-US" smtClean="0"/>
-              <a:t>5/21/2020</a:t>
+              <a:t>5/25/2020</a:t>
             </a:fld>
             <a:endParaRPr lang="en-US"/>
           </a:p>
@@ -2101,7 +2104,7 @@
           <a:p>
             <a:fld id="{B054DD91-EB8A-463F-8F8B-D25AE6D5CF75}" type="datetimeFigureOut">
               <a:rPr lang="en-US" smtClean="0"/>
-              <a:t>5/21/2020</a:t>
+              <a:t>5/25/2020</a:t>
             </a:fld>
             <a:endParaRPr lang="en-US"/>
           </a:p>
@@ -2412,7 +2415,7 @@
           <a:p>
             <a:fld id="{B054DD91-EB8A-463F-8F8B-D25AE6D5CF75}" type="datetimeFigureOut">
               <a:rPr lang="en-US" smtClean="0"/>
-              <a:t>5/21/2020</a:t>
+              <a:t>5/25/2020</a:t>
             </a:fld>
             <a:endParaRPr lang="en-US"/>
           </a:p>
@@ -2700,7 +2703,7 @@
           <a:p>
             <a:fld id="{B054DD91-EB8A-463F-8F8B-D25AE6D5CF75}" type="datetimeFigureOut">
               <a:rPr lang="en-US" smtClean="0"/>
-              <a:t>5/21/2020</a:t>
+              <a:t>5/25/2020</a:t>
             </a:fld>
             <a:endParaRPr lang="en-US"/>
           </a:p>
@@ -2941,7 +2944,7 @@
           <a:p>
             <a:fld id="{B054DD91-EB8A-463F-8F8B-D25AE6D5CF75}" type="datetimeFigureOut">
               <a:rPr lang="en-US" smtClean="0"/>
-              <a:t>5/21/2020</a:t>
+              <a:t>5/25/2020</a:t>
             </a:fld>
             <a:endParaRPr lang="en-US"/>
           </a:p>
@@ -3707,6 +3710,31 @@
               <a:buNone/>
             </a:pPr>
             <a:r>
+              <a:rPr lang="en-US" sz="1600" dirty="0">
+                <a:solidFill>
+                  <a:srgbClr val="FF0000"/>
+                </a:solidFill>
+              </a:rPr>
+              <a:t>=</a:t>
+            </a:r>
+            <a:r>
+              <a:rPr lang="en-US" sz="1600" dirty="0"/>
+              <a:t> - </a:t>
+            </a:r>
+            <a:r>
+              <a:rPr lang="hy-AM" sz="1600" dirty="0"/>
+              <a:t>վերագրում, </a:t>
+            </a:r>
+            <a:r>
+              <a:rPr lang="en-US" sz="1600" dirty="0"/>
+              <a:t>assignment</a:t>
+            </a:r>
+          </a:p>
+          <a:p>
+            <a:pPr marL="0" indent="0">
+              <a:buNone/>
+            </a:pPr>
+            <a:r>
               <a:rPr lang="hy-AM" sz="1600" dirty="0">
                 <a:solidFill>
                   <a:schemeClr val="accent4"/>
@@ -5425,7 +5453,7 @@
                   <a:schemeClr val="accent5"/>
                 </a:solidFill>
               </a:rPr>
-              <a:t>//a</a:t>
+              <a:t>//$a</a:t>
             </a:r>
             <a:r>
               <a:rPr lang="hy-AM" sz="1200" dirty="0">
@@ -5644,7 +5672,12 @@
             <p:ph idx="1"/>
           </p:nvPr>
         </p:nvSpPr>
-        <p:spPr/>
+        <p:spPr>
+          <a:xfrm>
+            <a:off x="994508" y="1974117"/>
+            <a:ext cx="10515600" cy="4351338"/>
+          </a:xfrm>
+        </p:spPr>
         <p:txBody>
           <a:bodyPr>
             <a:normAutofit/>
@@ -5656,7 +5689,7 @@
             </a:pPr>
             <a:r>
               <a:rPr lang="hy-AM" sz="1600" dirty="0"/>
-              <a:t>Բուլյան տիպի փոփոխականները կարող են ընդունել երկու արեք՝ </a:t>
+              <a:t>Բուլյան տիպի փոփոխականները կարող են ընդունել երկու արժեք՝ </a:t>
             </a:r>
             <a:r>
               <a:rPr lang="en-US" sz="1600" dirty="0">
@@ -5690,9 +5723,12 @@
               <a:rPr lang="hy-AM" sz="1600" dirty="0"/>
               <a:t>կեղծ)</a:t>
             </a:r>
-            <a:r>
-              <a:rPr lang="hy-AM" dirty="0"/>
-              <a:t> </a:t>
+            <a:br>
+              <a:rPr lang="en-US" sz="1600" dirty="0"/>
+            </a:br>
+            <a:r>
+              <a:rPr lang="hy-AM" sz="1600" dirty="0"/>
+              <a:t>Ասույթների հանրահաշիվ։</a:t>
             </a:r>
             <a:endParaRPr lang="en-US" dirty="0"/>
           </a:p>
@@ -6003,10 +6039,15 @@
             <p:ph idx="1"/>
           </p:nvPr>
         </p:nvSpPr>
-        <p:spPr/>
+        <p:spPr>
+          <a:xfrm>
+            <a:off x="752230" y="1833441"/>
+            <a:ext cx="10515600" cy="4351338"/>
+          </a:xfrm>
+        </p:spPr>
         <p:txBody>
           <a:bodyPr>
-            <a:normAutofit/>
+            <a:normAutofit fontScale="92500" lnSpcReduction="10000"/>
           </a:bodyPr>
           <a:lstStyle/>
           <a:p>
@@ -6176,8 +6217,116 @@
             </a:r>
             <a:r>
               <a:rPr lang="hy-AM" sz="1900" dirty="0"/>
-              <a:t>արժեքները: </a:t>
-            </a:r>
+              <a:t>արժեքները: </a:t>
+            </a:r>
+            <a:endParaRPr lang="en-US" sz="1900" dirty="0"/>
+          </a:p>
+          <a:p>
+            <a:pPr marL="0" indent="0">
+              <a:buNone/>
+            </a:pPr>
+            <a:r>
+              <a:rPr lang="hy-AM" sz="1900" dirty="0">
+                <a:solidFill>
+                  <a:srgbClr val="FF0000"/>
+                </a:solidFill>
+              </a:rPr>
+              <a:t>Քանի որ </a:t>
+            </a:r>
+            <a:r>
+              <a:rPr lang="en-US" sz="1900" dirty="0">
+                <a:solidFill>
+                  <a:srgbClr val="FF0000"/>
+                </a:solidFill>
+              </a:rPr>
+              <a:t>PHP-</a:t>
+            </a:r>
+            <a:r>
+              <a:rPr lang="hy-AM" sz="1900" dirty="0">
+                <a:solidFill>
+                  <a:srgbClr val="FF0000"/>
+                </a:solidFill>
+              </a:rPr>
+              <a:t>ն </a:t>
+            </a:r>
+            <a:r>
+              <a:rPr lang="en-US" sz="1900" dirty="0">
+                <a:solidFill>
+                  <a:srgbClr val="FF0000"/>
+                </a:solidFill>
+              </a:rPr>
+              <a:t>loose type programming language</a:t>
+            </a:r>
+            <a:r>
+              <a:rPr lang="hy-AM" sz="1900" dirty="0">
+                <a:solidFill>
+                  <a:srgbClr val="FF0000"/>
+                </a:solidFill>
+              </a:rPr>
+              <a:t> </a:t>
+            </a:r>
+            <a:endParaRPr lang="en-US" sz="1900" dirty="0">
+              <a:solidFill>
+                <a:srgbClr val="FF0000"/>
+              </a:solidFill>
+            </a:endParaRPr>
+          </a:p>
+          <a:p>
+            <a:pPr marL="0" indent="0">
+              <a:buNone/>
+            </a:pPr>
+            <a:r>
+              <a:rPr lang="en-US" sz="1900" dirty="0">
+                <a:highlight>
+                  <a:srgbClr val="FFFF00"/>
+                </a:highlight>
+              </a:rPr>
+              <a:t>false == 0; //true</a:t>
+            </a:r>
+          </a:p>
+          <a:p>
+            <a:pPr marL="0" indent="0">
+              <a:buNone/>
+            </a:pPr>
+            <a:r>
+              <a:rPr lang="en-US" sz="1900" dirty="0">
+                <a:highlight>
+                  <a:srgbClr val="FFFF00"/>
+                </a:highlight>
+              </a:rPr>
+              <a:t>false == null;// true</a:t>
+            </a:r>
+          </a:p>
+          <a:p>
+            <a:pPr marL="0" indent="0">
+              <a:buNone/>
+            </a:pPr>
+            <a:r>
+              <a:rPr lang="en-US" sz="1900" dirty="0">
+                <a:highlight>
+                  <a:srgbClr val="FFFF00"/>
+                </a:highlight>
+              </a:rPr>
+              <a:t>false == NULL; // true;</a:t>
+            </a:r>
+          </a:p>
+          <a:p>
+            <a:pPr marL="0" indent="0">
+              <a:buNone/>
+            </a:pPr>
+            <a:r>
+              <a:rPr lang="en-US" sz="1900" dirty="0">
+                <a:highlight>
+                  <a:srgbClr val="FFFF00"/>
+                </a:highlight>
+              </a:rPr>
+              <a:t>FALSE == ‘’; //true</a:t>
+            </a:r>
+            <a:endParaRPr lang="hy-AM" sz="1900" dirty="0">
+              <a:highlight>
+                <a:srgbClr val="FFFF00"/>
+              </a:highlight>
+            </a:endParaRPr>
           </a:p>
           <a:p>
             <a:pPr marL="0" indent="0">
@@ -6252,13 +6401,20 @@
             <p:ph type="title"/>
           </p:nvPr>
         </p:nvSpPr>
-        <p:spPr/>
+        <p:spPr>
+          <a:xfrm>
+            <a:off x="838200" y="365125"/>
+            <a:ext cx="10515600" cy="627429"/>
+          </a:xfrm>
+        </p:spPr>
         <p:txBody>
-          <a:bodyPr/>
+          <a:bodyPr>
+            <a:normAutofit/>
+          </a:bodyPr>
           <a:lstStyle/>
           <a:p>
             <a:r>
-              <a:rPr lang="hy-AM" dirty="0">
+              <a:rPr lang="hy-AM" sz="2000" dirty="0">
                 <a:solidFill>
                   <a:srgbClr val="FF0000"/>
                 </a:solidFill>
@@ -6266,7 +6422,7 @@
               <a:t>Տրամաբանական</a:t>
             </a:r>
             <a:r>
-              <a:rPr lang="en-US" dirty="0">
+              <a:rPr lang="en-US" sz="2000" dirty="0">
                 <a:solidFill>
                   <a:srgbClr val="FF0000"/>
                 </a:solidFill>
@@ -6274,7 +6430,7 @@
               <a:t>(</a:t>
             </a:r>
             <a:r>
-              <a:rPr lang="hy-AM" dirty="0">
+              <a:rPr lang="hy-AM" sz="2000" dirty="0">
                 <a:solidFill>
                   <a:srgbClr val="FF0000"/>
                 </a:solidFill>
@@ -6282,7 +6438,7 @@
               <a:t>Բուլյան</a:t>
             </a:r>
             <a:r>
-              <a:rPr lang="en-US" dirty="0">
+              <a:rPr lang="en-US" sz="2000" dirty="0">
                 <a:solidFill>
                   <a:srgbClr val="FF0000"/>
                 </a:solidFill>
@@ -6290,14 +6446,14 @@
               <a:t>)</a:t>
             </a:r>
             <a:r>
-              <a:rPr lang="hy-AM" dirty="0">
+              <a:rPr lang="hy-AM" sz="2000" dirty="0">
                 <a:solidFill>
                   <a:srgbClr val="FF0000"/>
                 </a:solidFill>
               </a:rPr>
               <a:t> տիպ</a:t>
             </a:r>
-            <a:endParaRPr lang="en-US" dirty="0"/>
+            <a:endParaRPr lang="en-US" sz="2000" dirty="0"/>
           </a:p>
         </p:txBody>
       </p:sp>
@@ -6317,7 +6473,12 @@
             <p:ph idx="1"/>
           </p:nvPr>
         </p:nvSpPr>
-        <p:spPr/>
+        <p:spPr>
+          <a:xfrm>
+            <a:off x="838200" y="890954"/>
+            <a:ext cx="10515600" cy="5681783"/>
+          </a:xfrm>
+        </p:spPr>
         <p:txBody>
           <a:bodyPr>
             <a:normAutofit fontScale="55000" lnSpcReduction="20000"/>
@@ -6409,7 +6570,7 @@
             </a:r>
             <a:r>
               <a:rPr lang="en-US" dirty="0"/>
-              <a:t>A B  &amp;&amp;</a:t>
+              <a:t>A B  &amp;&amp;   A B C &amp;&amp;</a:t>
             </a:r>
           </a:p>
           <a:p>
@@ -6418,7 +6579,7 @@
             </a:pPr>
             <a:r>
               <a:rPr lang="en-US" dirty="0"/>
-              <a:t> 0 0   0</a:t>
+              <a:t> 0 0   0      0 0 0  0</a:t>
             </a:r>
           </a:p>
           <a:p>
@@ -6427,7 +6588,7 @@
             </a:pPr>
             <a:r>
               <a:rPr lang="en-US" dirty="0"/>
-              <a:t> 0 1   0</a:t>
+              <a:t> 0 1   0      0 0 1  0</a:t>
             </a:r>
           </a:p>
           <a:p>
@@ -6436,7 +6597,7 @@
             </a:pPr>
             <a:r>
               <a:rPr lang="en-US" dirty="0"/>
-              <a:t> 1 0   0</a:t>
+              <a:t> 1 0   0      0 1 0  0</a:t>
             </a:r>
           </a:p>
           <a:p>
@@ -6449,17 +6610,80 @@
             </a:r>
             <a:r>
               <a:rPr lang="en-US" b="1" dirty="0"/>
-              <a:t>1 1   1</a:t>
-            </a:r>
-            <a:endParaRPr lang="en-US" dirty="0"/>
-          </a:p>
-          <a:p>
-            <a:pPr marL="0" indent="0">
-              <a:buNone/>
-            </a:pPr>
+              <a:t>1 1   1      </a:t>
+            </a:r>
+            <a:r>
+              <a:rPr lang="en-US" dirty="0"/>
+              <a:t>0 1 1  0</a:t>
+            </a:r>
+          </a:p>
+          <a:p>
+            <a:pPr marL="0" indent="0">
+              <a:buNone/>
+            </a:pPr>
+            <a:r>
+              <a:rPr lang="en-US" dirty="0"/>
+              <a:t>                 1 0 0  0</a:t>
+            </a:r>
+          </a:p>
+          <a:p>
+            <a:pPr marL="0" indent="0">
+              <a:buNone/>
+            </a:pPr>
+            <a:r>
+              <a:rPr lang="en-US" dirty="0"/>
+              <a:t>                 1 0 1  0</a:t>
+            </a:r>
+          </a:p>
+          <a:p>
+            <a:pPr marL="0" indent="0">
+              <a:buNone/>
+            </a:pPr>
+            <a:r>
+              <a:rPr lang="en-US" sz="2900" dirty="0"/>
+              <a:t>                 1 1 0  0</a:t>
+            </a:r>
+          </a:p>
+          <a:p>
+            <a:pPr marL="0" indent="0">
+              <a:buNone/>
+            </a:pPr>
+            <a:r>
+              <a:rPr lang="en-US" sz="1900" dirty="0"/>
+              <a:t>                         </a:t>
+            </a:r>
+            <a:r>
+              <a:rPr lang="en-US" sz="1900" b="1" dirty="0"/>
+              <a:t>1   1  1      1</a:t>
+            </a:r>
+          </a:p>
+          <a:p>
+            <a:pPr marL="0" indent="0">
+              <a:buNone/>
+            </a:pPr>
+            <a:endParaRPr lang="en-US" sz="1900" dirty="0"/>
+          </a:p>
+          <a:p>
+            <a:pPr marL="0" indent="0">
+              <a:buNone/>
+            </a:pPr>
+            <a:endParaRPr lang="en-US" sz="1900" dirty="0"/>
+          </a:p>
+          <a:p>
+            <a:pPr marL="0" indent="0">
+              <a:buNone/>
+            </a:pPr>
+            <a:r>
+              <a:rPr lang="en-US" sz="1900" dirty="0"/>
+              <a:t>(111)2 = 1* 2(2) + 1 * 2(1) + 1 * 2(0) = 7</a:t>
+            </a:r>
             <a:br>
               <a:rPr lang="hy-AM" sz="1900" dirty="0"/>
             </a:br>
+            <a:r>
+              <a:rPr lang="en-US" sz="1900" dirty="0"/>
+              <a:t>                          </a:t>
+            </a:r>
             <a:endParaRPr lang="hy-AM" sz="1900" dirty="0"/>
           </a:p>
         </p:txBody>
@@ -6873,7 +7097,7 @@
             </a:pPr>
             <a:r>
               <a:rPr lang="en-US" sz="1600" dirty="0"/>
-              <a:t> 0  0</a:t>
+              <a:t> 0  1</a:t>
             </a:r>
           </a:p>
           <a:p>
@@ -6882,7 +7106,7 @@
             </a:pPr>
             <a:r>
               <a:rPr lang="en-US" sz="1600" dirty="0"/>
-              <a:t> 1  1</a:t>
+              <a:t> 1  0</a:t>
             </a:r>
           </a:p>
           <a:p>
@@ -7018,7 +7242,7 @@
         </p:spPr>
         <p:txBody>
           <a:bodyPr>
-            <a:normAutofit/>
+            <a:normAutofit fontScale="92500" lnSpcReduction="10000"/>
           </a:bodyPr>
           <a:lstStyle/>
           <a:p>
@@ -7105,6 +7329,43 @@
             <a:pPr marL="0" indent="0">
               <a:buNone/>
             </a:pPr>
+            <a:endParaRPr lang="en-US" sz="1700" dirty="0"/>
+          </a:p>
+          <a:p>
+            <a:pPr marL="0" indent="0">
+              <a:buNone/>
+            </a:pPr>
+            <a:r>
+              <a:rPr lang="en-US" sz="1700" dirty="0"/>
+              <a:t>Decimal(10)</a:t>
+            </a:r>
+          </a:p>
+          <a:p>
+            <a:pPr marL="0" indent="0">
+              <a:buNone/>
+            </a:pPr>
+            <a:r>
+              <a:rPr lang="en-US" sz="1700" dirty="0"/>
+              <a:t>0 + 0 = 0</a:t>
+            </a:r>
+          </a:p>
+          <a:p>
+            <a:pPr marL="0" indent="0">
+              <a:buNone/>
+            </a:pPr>
+            <a:r>
+              <a:rPr lang="en-US" sz="1700" dirty="0"/>
+              <a:t>9 + 0 = 0</a:t>
+            </a:r>
+          </a:p>
+          <a:p>
+            <a:pPr marL="0" indent="0">
+              <a:buNone/>
+            </a:pPr>
+            <a:r>
+              <a:rPr lang="en-US" sz="1300" dirty="0"/>
+              <a:t>Binary(2)</a:t>
+            </a:r>
             <a:br>
               <a:rPr lang="en-US" dirty="0"/>
             </a:br>
@@ -7728,7 +7989,15 @@
             </a:r>
             <a:r>
               <a:rPr lang="en-US" sz="1400" dirty="0"/>
-              <a:t>;</a:t>
+              <a:t>;// </a:t>
+            </a:r>
+            <a:r>
+              <a:rPr lang="en-US" sz="1400" dirty="0" err="1"/>
+              <a:t>gettype</a:t>
+            </a:r>
+            <a:r>
+              <a:rPr lang="en-US" sz="1400" dirty="0"/>
+              <a:t>($a); integer</a:t>
             </a:r>
           </a:p>
           <a:p>
@@ -7749,7 +8018,15 @@
             </a:r>
             <a:r>
               <a:rPr lang="en-US" sz="1400" dirty="0"/>
-              <a:t>;</a:t>
+              <a:t>; // </a:t>
+            </a:r>
+            <a:r>
+              <a:rPr lang="en-US" sz="1400" dirty="0" err="1"/>
+              <a:t>gettype</a:t>
+            </a:r>
+            <a:r>
+              <a:rPr lang="en-US" sz="1400" dirty="0"/>
+              <a:t>($b); integer</a:t>
             </a:r>
           </a:p>
           <a:p>
@@ -7836,6 +8113,11 @@
               </a:rPr>
               <a:t>ն արժեքներով իրար հավասար են և նույն տիպ ունեն</a:t>
             </a:r>
+            <a:endParaRPr lang="en-US" sz="1200" dirty="0">
+              <a:solidFill>
+                <a:schemeClr val="accent5"/>
+              </a:solidFill>
+            </a:endParaRPr>
           </a:p>
           <a:p>
             <a:pPr marL="0" indent="0">
@@ -8872,7 +9154,7 @@
                   <a:schemeClr val="accent5"/>
                 </a:solidFill>
               </a:rPr>
-              <a:t>ն արժեքներով իրար հավասար են և նույն տիպը ունեն</a:t>
+              <a:t>ն արժեքներով իրար հավասար են և նույն տիպը չեն</a:t>
             </a:r>
           </a:p>
           <a:p>
@@ -9762,7 +10044,7 @@
         </p:nvSpPr>
         <p:spPr>
           <a:xfrm>
-            <a:off x="838200" y="1531814"/>
+            <a:off x="838200" y="1547445"/>
             <a:ext cx="10515600" cy="5095631"/>
           </a:xfrm>
         </p:spPr>
@@ -10137,7 +10419,7 @@
             </a:pPr>
             <a:r>
               <a:rPr lang="hy-AM" sz="2500" dirty="0"/>
-              <a:t>Մենք մեզ համար ցանկալի արդյունքը կստանանք այն դեպքում, երբ կարողանանք փոփոխականներին ճիշտ ձևով տալ արժեքներև ավտոմացնել:</a:t>
+              <a:t>Մենք մեզ համար ցանկալի արդյունքը կստանանք այն դեպքում, երբ կարողանանք փոփոխականներին ճիշտ ձևով տալ արժեքներ և ավտոմացնել:</a:t>
             </a:r>
           </a:p>
           <a:p>
@@ -11229,6 +11511,32 @@
             <a:pPr marL="0" indent="0">
               <a:buNone/>
             </a:pPr>
+            <a:r>
+              <a:rPr lang="en-US" sz="1400" dirty="0">
+                <a:highlight>
+                  <a:srgbClr val="FFFF00"/>
+                </a:highlight>
+              </a:rPr>
+              <a:t>$a++;</a:t>
+            </a:r>
+          </a:p>
+          <a:p>
+            <a:pPr marL="0" indent="0">
+              <a:buNone/>
+            </a:pPr>
+            <a:r>
+              <a:rPr lang="en-US" sz="1400" dirty="0">
+                <a:highlight>
+                  <a:srgbClr val="FFFF00"/>
+                </a:highlight>
+              </a:rPr>
+              <a:t>++$a;</a:t>
+            </a:r>
+          </a:p>
+          <a:p>
+            <a:pPr marL="0" indent="0">
+              <a:buNone/>
+            </a:pPr>
             <a:endParaRPr lang="en-US" sz="1400" dirty="0"/>
           </a:p>
           <a:p>
@@ -11284,11 +11592,16 @@
           </a:p>
           <a:p>
             <a:pPr marL="0" indent="0">
-              <a:lnSpc>
-                <a:spcPct val="120000"/>
-              </a:lnSpc>
-              <a:buNone/>
-            </a:pPr>
+              <a:buNone/>
+            </a:pPr>
+            <a:r>
+              <a:rPr lang="en-US" sz="1400" dirty="0">
+                <a:highlight>
+                  <a:srgbClr val="FFFF00"/>
+                </a:highlight>
+              </a:rPr>
+              <a:t>$a--;</a:t>
+            </a:r>
             <a:br>
               <a:rPr lang="en-US" dirty="0"/>
             </a:br>
@@ -12854,7 +13167,7 @@
           <a:lstStyle/>
           <a:p>
             <a:r>
-              <a:rPr lang="hy-AM">
+              <a:rPr lang="hy-AM" dirty="0">
                 <a:solidFill>
                   <a:srgbClr val="FF0000"/>
                 </a:solidFill>
@@ -12906,7 +13219,7 @@
             </a:r>
             <a:r>
               <a:rPr lang="hy-AM" sz="1300" i="1" dirty="0"/>
-              <a:t>Պատահական թվերի գենարացման ֆունկցիայի միջոցով ստանալ թիվ 1-ից 2016 միջակայքում:Եթե գեներացված թիվը երկնիշ թիվ է, ապա գտնել այդ </a:t>
+              <a:t>Պատահական թվերի գեներացման ֆունկցիայի միջոցով ստանալ թիվ 1-ից 2016 միջակայքում:Եթե գեներացված թիվը երկնիշ թիվ է, ապա գտնել այդ </a:t>
             </a:r>
             <a:endParaRPr lang="hy-AM" sz="1300" dirty="0"/>
           </a:p>
@@ -12986,6 +13299,369 @@
 </file>
 
 <file path=ppt/slides/slide33.xml><?xml version="1.0" encoding="utf-8"?>
+<p:sld xmlns:a="http://schemas.openxmlformats.org/drawingml/2006/main" xmlns:r="http://schemas.openxmlformats.org/officeDocument/2006/relationships" xmlns:p="http://schemas.openxmlformats.org/presentationml/2006/main">
+  <p:cSld>
+    <p:spTree>
+      <p:nvGrpSpPr>
+        <p:cNvPr id="1" name=""/>
+        <p:cNvGrpSpPr/>
+        <p:nvPr/>
+      </p:nvGrpSpPr>
+      <p:grpSpPr>
+        <a:xfrm>
+          <a:off x="0" y="0"/>
+          <a:ext cx="0" cy="0"/>
+          <a:chOff x="0" y="0"/>
+          <a:chExt cx="0" cy="0"/>
+        </a:xfrm>
+      </p:grpSpPr>
+      <p:sp>
+        <p:nvSpPr>
+          <p:cNvPr id="2" name="Title 1">
+            <a:extLst>
+              <a:ext uri="{FF2B5EF4-FFF2-40B4-BE49-F238E27FC236}">
+                <a16:creationId xmlns:a16="http://schemas.microsoft.com/office/drawing/2014/main" id="{54031E72-C008-437F-A186-6D7AD8FE7412}"/>
+              </a:ext>
+            </a:extLst>
+          </p:cNvPr>
+          <p:cNvSpPr>
+            <a:spLocks noGrp="1"/>
+          </p:cNvSpPr>
+          <p:nvPr>
+            <p:ph type="title"/>
+          </p:nvPr>
+        </p:nvSpPr>
+        <p:spPr>
+          <a:xfrm>
+            <a:off x="838200" y="365126"/>
+            <a:ext cx="10515600" cy="736844"/>
+          </a:xfrm>
+        </p:spPr>
+        <p:txBody>
+          <a:bodyPr/>
+          <a:lstStyle/>
+          <a:p>
+            <a:r>
+              <a:rPr lang="hy-AM" dirty="0">
+                <a:solidFill>
+                  <a:srgbClr val="FF0000"/>
+                </a:solidFill>
+              </a:rPr>
+              <a:t>Խնդիրներ</a:t>
+            </a:r>
+            <a:endParaRPr lang="en-US" dirty="0"/>
+          </a:p>
+        </p:txBody>
+      </p:sp>
+      <p:sp>
+        <p:nvSpPr>
+          <p:cNvPr id="3" name="Content Placeholder 2">
+            <a:extLst>
+              <a:ext uri="{FF2B5EF4-FFF2-40B4-BE49-F238E27FC236}">
+                <a16:creationId xmlns:a16="http://schemas.microsoft.com/office/drawing/2014/main" id="{472AB4D0-87C6-483A-B152-3CB4483C347A}"/>
+              </a:ext>
+            </a:extLst>
+          </p:cNvPr>
+          <p:cNvSpPr>
+            <a:spLocks noGrp="1"/>
+          </p:cNvSpPr>
+          <p:nvPr>
+            <p:ph idx="1"/>
+          </p:nvPr>
+        </p:nvSpPr>
+        <p:spPr>
+          <a:xfrm>
+            <a:off x="838200" y="1219200"/>
+            <a:ext cx="10515600" cy="4957763"/>
+          </a:xfrm>
+        </p:spPr>
+        <p:txBody>
+          <a:bodyPr>
+            <a:normAutofit/>
+          </a:bodyPr>
+          <a:lstStyle/>
+          <a:p>
+            <a:r>
+              <a:rPr lang="hy-AM" sz="2400" dirty="0"/>
+              <a:t>Ֆորմայի տեքստայի դաշտի մեջ մուտքագրել թիվ և հաշվել նրա թվանշանների քանակը</a:t>
+            </a:r>
+          </a:p>
+          <a:p>
+            <a:r>
+              <a:rPr lang="hy-AM" sz="2400" dirty="0"/>
+              <a:t>Գտնել տրված միջակայքում </a:t>
+            </a:r>
+            <a:r>
+              <a:rPr lang="en-US" sz="2400" dirty="0"/>
+              <a:t>3-</a:t>
+            </a:r>
+            <a:r>
+              <a:rPr lang="hy-AM" sz="2400" dirty="0"/>
+              <a:t>ի և </a:t>
+            </a:r>
+            <a:r>
+              <a:rPr lang="en-US" sz="2400" dirty="0"/>
+              <a:t>5-</a:t>
+            </a:r>
+            <a:r>
+              <a:rPr lang="hy-AM" sz="2400" dirty="0"/>
+              <a:t>ի վրա բաժանվող զույգ թվերի գումարը։</a:t>
+            </a:r>
+          </a:p>
+          <a:p>
+            <a:r>
+              <a:rPr lang="hy-AM" sz="2400" dirty="0"/>
+              <a:t>Տրված միջակայքում գտնել պարզ թվերը</a:t>
+            </a:r>
+          </a:p>
+          <a:p>
+            <a:r>
+              <a:rPr lang="hy-AM" sz="2400" dirty="0"/>
+              <a:t>Տրված միջակայքում գտնել կատարյալ թվերը</a:t>
+            </a:r>
+            <a:r>
+              <a:rPr lang="en-US" sz="2400" dirty="0"/>
+              <a:t>(6,28,496)</a:t>
+            </a:r>
+          </a:p>
+          <a:p>
+            <a:pPr marL="0" indent="0">
+              <a:buNone/>
+            </a:pPr>
+            <a:r>
+              <a:rPr lang="en-US" sz="2400" dirty="0"/>
+              <a:t>6 = 1 + 2 + 3</a:t>
+            </a:r>
+          </a:p>
+          <a:p>
+            <a:pPr marL="0" indent="0">
+              <a:buNone/>
+            </a:pPr>
+            <a:r>
+              <a:rPr lang="hy-AM" sz="2400" dirty="0"/>
+              <a:t>Ընկեր թվեր։ 36 </a:t>
+            </a:r>
+            <a:r>
+              <a:rPr lang="en-US" sz="2400" dirty="0"/>
+              <a:t>%</a:t>
+            </a:r>
+            <a:r>
+              <a:rPr lang="hy-AM" sz="2400" dirty="0"/>
+              <a:t> 3 </a:t>
+            </a:r>
+            <a:r>
+              <a:rPr lang="en-US" sz="2400" dirty="0"/>
+              <a:t>+ 6, 48 % 4 +8</a:t>
+            </a:r>
+          </a:p>
+          <a:p>
+            <a:pPr marL="0" indent="0">
+              <a:buNone/>
+            </a:pPr>
+            <a:r>
+              <a:rPr lang="hy-AM" sz="2400" dirty="0"/>
+              <a:t>Գտնել տրված միջակայքում ընկեր թվերը</a:t>
+            </a:r>
+            <a:endParaRPr lang="en-US" sz="2400" dirty="0"/>
+          </a:p>
+        </p:txBody>
+      </p:sp>
+    </p:spTree>
+    <p:extLst>
+      <p:ext uri="{BB962C8B-B14F-4D97-AF65-F5344CB8AC3E}">
+        <p14:creationId xmlns:p14="http://schemas.microsoft.com/office/powerpoint/2010/main" val="1344973461"/>
+      </p:ext>
+    </p:extLst>
+  </p:cSld>
+  <p:clrMapOvr>
+    <a:masterClrMapping/>
+  </p:clrMapOvr>
+</p:sld>
+</file>
+
+<file path=ppt/slides/slide34.xml><?xml version="1.0" encoding="utf-8"?>
+<p:sld xmlns:a="http://schemas.openxmlformats.org/drawingml/2006/main" xmlns:r="http://schemas.openxmlformats.org/officeDocument/2006/relationships" xmlns:p="http://schemas.openxmlformats.org/presentationml/2006/main">
+  <p:cSld>
+    <p:spTree>
+      <p:nvGrpSpPr>
+        <p:cNvPr id="1" name=""/>
+        <p:cNvGrpSpPr/>
+        <p:nvPr/>
+      </p:nvGrpSpPr>
+      <p:grpSpPr>
+        <a:xfrm>
+          <a:off x="0" y="0"/>
+          <a:ext cx="0" cy="0"/>
+          <a:chOff x="0" y="0"/>
+          <a:chExt cx="0" cy="0"/>
+        </a:xfrm>
+      </p:grpSpPr>
+      <p:sp>
+        <p:nvSpPr>
+          <p:cNvPr id="2" name="Title 1">
+            <a:extLst>
+              <a:ext uri="{FF2B5EF4-FFF2-40B4-BE49-F238E27FC236}">
+                <a16:creationId xmlns:a16="http://schemas.microsoft.com/office/drawing/2014/main" id="{B0CEF9FD-70CA-4EDA-8104-8113D249E04E}"/>
+              </a:ext>
+            </a:extLst>
+          </p:cNvPr>
+          <p:cNvSpPr>
+            <a:spLocks noGrp="1"/>
+          </p:cNvSpPr>
+          <p:nvPr>
+            <p:ph type="title"/>
+          </p:nvPr>
+        </p:nvSpPr>
+        <p:spPr>
+          <a:xfrm>
+            <a:off x="838200" y="365125"/>
+            <a:ext cx="10515600" cy="689951"/>
+          </a:xfrm>
+        </p:spPr>
+        <p:txBody>
+          <a:bodyPr>
+            <a:normAutofit fontScale="90000"/>
+          </a:bodyPr>
+          <a:lstStyle/>
+          <a:p>
+            <a:r>
+              <a:rPr lang="hy-AM" dirty="0"/>
+              <a:t>Ստանալ հետևյալ եռանկյունները</a:t>
+            </a:r>
+            <a:endParaRPr lang="en-US" dirty="0"/>
+          </a:p>
+        </p:txBody>
+      </p:sp>
+      <p:pic>
+        <p:nvPicPr>
+          <p:cNvPr id="4" name="Content Placeholder 3">
+            <a:extLst>
+              <a:ext uri="{FF2B5EF4-FFF2-40B4-BE49-F238E27FC236}">
+                <a16:creationId xmlns:a16="http://schemas.microsoft.com/office/drawing/2014/main" id="{06ACD206-1B81-44DE-9CE7-80B414DD1267}"/>
+              </a:ext>
+            </a:extLst>
+          </p:cNvPr>
+          <p:cNvPicPr>
+            <a:picLocks noGrp="1" noChangeAspect="1"/>
+          </p:cNvPicPr>
+          <p:nvPr>
+            <p:ph idx="1"/>
+          </p:nvPr>
+        </p:nvPicPr>
+        <p:blipFill>
+          <a:blip r:embed="rId2"/>
+          <a:stretch>
+            <a:fillRect/>
+          </a:stretch>
+        </p:blipFill>
+        <p:spPr>
+          <a:xfrm>
+            <a:off x="838200" y="1163151"/>
+            <a:ext cx="2699177" cy="4351338"/>
+          </a:xfrm>
+          <a:prstGeom prst="rect">
+            <a:avLst/>
+          </a:prstGeom>
+        </p:spPr>
+      </p:pic>
+    </p:spTree>
+    <p:extLst>
+      <p:ext uri="{BB962C8B-B14F-4D97-AF65-F5344CB8AC3E}">
+        <p14:creationId xmlns:p14="http://schemas.microsoft.com/office/powerpoint/2010/main" val="1783419586"/>
+      </p:ext>
+    </p:extLst>
+  </p:cSld>
+  <p:clrMapOvr>
+    <a:masterClrMapping/>
+  </p:clrMapOvr>
+</p:sld>
+</file>
+
+<file path=ppt/slides/slide35.xml><?xml version="1.0" encoding="utf-8"?>
+<p:sld xmlns:a="http://schemas.openxmlformats.org/drawingml/2006/main" xmlns:r="http://schemas.openxmlformats.org/officeDocument/2006/relationships" xmlns:p="http://schemas.openxmlformats.org/presentationml/2006/main">
+  <p:cSld>
+    <p:spTree>
+      <p:nvGrpSpPr>
+        <p:cNvPr id="1" name=""/>
+        <p:cNvGrpSpPr/>
+        <p:nvPr/>
+      </p:nvGrpSpPr>
+      <p:grpSpPr>
+        <a:xfrm>
+          <a:off x="0" y="0"/>
+          <a:ext cx="0" cy="0"/>
+          <a:chOff x="0" y="0"/>
+          <a:chExt cx="0" cy="0"/>
+        </a:xfrm>
+      </p:grpSpPr>
+      <p:sp>
+        <p:nvSpPr>
+          <p:cNvPr id="2" name="Title 1">
+            <a:extLst>
+              <a:ext uri="{FF2B5EF4-FFF2-40B4-BE49-F238E27FC236}">
+                <a16:creationId xmlns:a16="http://schemas.microsoft.com/office/drawing/2014/main" id="{8600A1AA-F375-40C2-9C0D-56ECBC72E94F}"/>
+              </a:ext>
+            </a:extLst>
+          </p:cNvPr>
+          <p:cNvSpPr>
+            <a:spLocks noGrp="1"/>
+          </p:cNvSpPr>
+          <p:nvPr>
+            <p:ph type="title"/>
+          </p:nvPr>
+        </p:nvSpPr>
+        <p:spPr/>
+        <p:txBody>
+          <a:bodyPr/>
+          <a:lstStyle/>
+          <a:p>
+            <a:endParaRPr lang="en-US" dirty="0"/>
+          </a:p>
+        </p:txBody>
+      </p:sp>
+      <p:sp>
+        <p:nvSpPr>
+          <p:cNvPr id="3" name="Content Placeholder 2">
+            <a:extLst>
+              <a:ext uri="{FF2B5EF4-FFF2-40B4-BE49-F238E27FC236}">
+                <a16:creationId xmlns:a16="http://schemas.microsoft.com/office/drawing/2014/main" id="{0B45A397-5EC5-4257-9A7D-E401FD6F0BC2}"/>
+              </a:ext>
+            </a:extLst>
+          </p:cNvPr>
+          <p:cNvSpPr>
+            <a:spLocks noGrp="1"/>
+          </p:cNvSpPr>
+          <p:nvPr>
+            <p:ph idx="1"/>
+          </p:nvPr>
+        </p:nvSpPr>
+        <p:spPr/>
+        <p:txBody>
+          <a:bodyPr/>
+          <a:lstStyle/>
+          <a:p>
+            <a:r>
+              <a:rPr lang="hy-AM" dirty="0"/>
+              <a:t>Նկարել շախմատի դաշտ</a:t>
+            </a:r>
+            <a:endParaRPr lang="en-US" dirty="0"/>
+          </a:p>
+        </p:txBody>
+      </p:sp>
+    </p:spTree>
+    <p:extLst>
+      <p:ext uri="{BB962C8B-B14F-4D97-AF65-F5344CB8AC3E}">
+        <p14:creationId xmlns:p14="http://schemas.microsoft.com/office/powerpoint/2010/main" val="1555475946"/>
+      </p:ext>
+    </p:extLst>
+  </p:cSld>
+  <p:clrMapOvr>
+    <a:masterClrMapping/>
+  </p:clrMapOvr>
+</p:sld>
+</file>
+
+<file path=ppt/slides/slide36.xml><?xml version="1.0" encoding="utf-8"?>
 <p:sld xmlns:a="http://schemas.openxmlformats.org/drawingml/2006/main" xmlns:r="http://schemas.openxmlformats.org/officeDocument/2006/relationships" xmlns:p="http://schemas.openxmlformats.org/presentationml/2006/main">
   <p:cSld>
     <p:bg>
@@ -15708,7 +16384,7 @@
                   <a:srgbClr val="FF0000"/>
                 </a:solidFill>
               </a:rPr>
-              <a:t>'b'</a:t>
+              <a:t>'b’</a:t>
             </a:r>
             <a:r>
               <a:rPr lang="en-US" sz="1600" dirty="0"/>
@@ -15720,8 +16396,12 @@
               <a:buNone/>
             </a:pPr>
             <a:r>
+              <a:rPr lang="hy-AM" sz="1600" dirty="0"/>
+              <a:t>$</a:t>
+            </a:r>
+            <a:r>
               <a:rPr lang="en-US" sz="1600" dirty="0"/>
-              <a:t>$b = </a:t>
+              <a:t>b = </a:t>
             </a:r>
             <a:r>
               <a:rPr lang="en-US" sz="1600" dirty="0">
@@ -15928,6 +16608,135 @@
               </a:rPr>
               <a:t>c:</a:t>
             </a:r>
+          </a:p>
+          <a:p>
+            <a:pPr marL="0" indent="0">
+              <a:buNone/>
+            </a:pPr>
+            <a:endParaRPr lang="en-US" sz="1200" dirty="0">
+              <a:solidFill>
+                <a:schemeClr val="accent5"/>
+              </a:solidFill>
+            </a:endParaRPr>
+          </a:p>
+          <a:p>
+            <a:pPr marL="0" indent="0">
+              <a:buNone/>
+            </a:pPr>
+            <a:r>
+              <a:rPr lang="hy-AM" sz="1200" dirty="0">
+                <a:solidFill>
+                  <a:schemeClr val="accent1"/>
+                </a:solidFill>
+              </a:rPr>
+              <a:t>$</a:t>
+            </a:r>
+            <a:r>
+              <a:rPr lang="en-US" sz="1200" dirty="0">
+                <a:solidFill>
+                  <a:schemeClr val="accent1"/>
+                </a:solidFill>
+              </a:rPr>
+              <a:t>a </a:t>
+            </a:r>
+            <a:r>
+              <a:rPr lang="en-US" sz="1200" dirty="0"/>
+              <a:t>= </a:t>
+            </a:r>
+            <a:r>
+              <a:rPr lang="en-US" sz="1200" dirty="0">
+                <a:solidFill>
+                  <a:srgbClr val="FF0000"/>
+                </a:solidFill>
+              </a:rPr>
+              <a:t>'b’</a:t>
+            </a:r>
+            <a:r>
+              <a:rPr lang="en-US" sz="1200" dirty="0"/>
+              <a:t>;</a:t>
+            </a:r>
+          </a:p>
+          <a:p>
+            <a:pPr marL="0" indent="0">
+              <a:buNone/>
+            </a:pPr>
+            <a:r>
+              <a:rPr lang="hy-AM" sz="1200" dirty="0"/>
+              <a:t>$</a:t>
+            </a:r>
+            <a:r>
+              <a:rPr lang="hy-AM" sz="1200" dirty="0">
+                <a:solidFill>
+                  <a:schemeClr val="accent1"/>
+                </a:solidFill>
+              </a:rPr>
+              <a:t>$</a:t>
+            </a:r>
+            <a:r>
+              <a:rPr lang="en-US" sz="1200" dirty="0">
+                <a:solidFill>
+                  <a:schemeClr val="accent1"/>
+                </a:solidFill>
+              </a:rPr>
+              <a:t>a</a:t>
+            </a:r>
+            <a:r>
+              <a:rPr lang="en-US" sz="1200" dirty="0"/>
+              <a:t> = </a:t>
+            </a:r>
+            <a:r>
+              <a:rPr lang="en-US" sz="1200" dirty="0">
+                <a:solidFill>
+                  <a:srgbClr val="FF0000"/>
+                </a:solidFill>
+              </a:rPr>
+              <a:t>‘c’</a:t>
+            </a:r>
+            <a:r>
+              <a:rPr lang="en-US" sz="1200" dirty="0"/>
+              <a:t>;</a:t>
+            </a:r>
+          </a:p>
+          <a:p>
+            <a:pPr marL="0" indent="0">
+              <a:buNone/>
+            </a:pPr>
+            <a:r>
+              <a:rPr lang="en-US" sz="1200" dirty="0">
+                <a:solidFill>
+                  <a:srgbClr val="FF0000"/>
+                </a:solidFill>
+              </a:rPr>
+              <a:t>echo</a:t>
+            </a:r>
+            <a:r>
+              <a:rPr lang="en-US" sz="1200" dirty="0"/>
+              <a:t> $b; </a:t>
+            </a:r>
+            <a:r>
+              <a:rPr lang="en-US" sz="1200" dirty="0">
+                <a:solidFill>
+                  <a:schemeClr val="accent1"/>
+                </a:solidFill>
+              </a:rPr>
+              <a:t>// c</a:t>
+            </a:r>
+          </a:p>
+          <a:p>
+            <a:pPr marL="0" indent="0">
+              <a:buNone/>
+            </a:pPr>
+            <a:endParaRPr lang="en-US" sz="1200" dirty="0"/>
+          </a:p>
+          <a:p>
+            <a:pPr marL="0" indent="0">
+              <a:buNone/>
+            </a:pPr>
+            <a:endParaRPr lang="en-US" sz="1200" dirty="0">
+              <a:solidFill>
+                <a:schemeClr val="accent5"/>
+              </a:solidFill>
+            </a:endParaRPr>
           </a:p>
           <a:p>
             <a:pPr marL="0" indent="0">

</xml_diff>